<commit_message>
revise layout of abe
</commit_message>
<xml_diff>
--- a/img/ss.pptx
+++ b/img/ss.pptx
@@ -151,7 +151,7 @@
       </p14:sectionLst>
     </p:ext>
     <p:ext uri="{EFAFB233-063F-42B5-8137-9DF3F51BA10A}">
-      <p15:sldGuideLst xmlns="" xmlns:p15="http://schemas.microsoft.com/office/powerpoint/2012/main">
+      <p15:sldGuideLst xmlns:p15="http://schemas.microsoft.com/office/powerpoint/2012/main" xmlns="">
         <p15:guide id="1" orient="horz" pos="2160">
           <p15:clr>
             <a:srgbClr val="A4A3A4"/>
@@ -165,7 +165,7 @@
       </p15:sldGuideLst>
     </p:ext>
     <p:ext uri="{2D200454-40CA-4A62-9FC3-DE9A4176ACB9}">
-      <p15:notesGuideLst xmlns="" xmlns:p15="http://schemas.microsoft.com/office/powerpoint/2012/main">
+      <p15:notesGuideLst xmlns:p15="http://schemas.microsoft.com/office/powerpoint/2012/main" xmlns="">
         <p15:guide id="1" orient="horz" pos="3223">
           <p15:clr>
             <a:srgbClr val="A4A3A4"/>
@@ -1985,8 +1985,8 @@
           </a:fontRef>
         </p:style>
       </p:cxnSp>
-      <mc:AlternateContent xmlns:mc="http://schemas.openxmlformats.org/markup-compatibility/2006" xmlns:a14="http://schemas.microsoft.com/office/drawing/2010/main">
-        <mc:Choice Requires="a14">
+      <mc:AlternateContent xmlns:mc="http://schemas.openxmlformats.org/markup-compatibility/2006">
+        <mc:Choice xmlns:a14="http://schemas.microsoft.com/office/drawing/2010/main" Requires="a14">
           <p:sp>
             <p:nvSpPr>
               <p:cNvPr id="17" name="テキスト ボックス 16"/>
@@ -1995,8 +1995,8 @@
             </p:nvSpPr>
             <p:spPr>
               <a:xfrm>
-                <a:off x="1262214" y="1211238"/>
-                <a:ext cx="2779946" cy="258960"/>
+                <a:off x="1262214" y="1366178"/>
+                <a:ext cx="2105723" cy="205100"/>
               </a:xfrm>
               <a:prstGeom prst="rect">
                 <a:avLst/>
@@ -2021,7 +2021,7 @@
                     </m:oMathParaPr>
                     <m:oMath xmlns:m="http://schemas.openxmlformats.org/officeDocument/2006/math">
                       <m:r>
-                        <a:rPr lang="en-US" altLang="ja-JP" sz="1400" b="0" i="1" smtClean="0">
+                        <a:rPr lang="en-US" altLang="ja-JP" sz="1050" b="0" i="1" smtClean="0">
                           <a:latin typeface="Cambria Math"/>
                           <a:ea typeface="+mj-ea"/>
                           <a:cs typeface="Courier New" pitchFamily="49" charset="0"/>
@@ -2029,7 +2029,7 @@
                         <m:t>𝑦</m:t>
                       </m:r>
                       <m:r>
-                        <a:rPr lang="en-US" altLang="ja-JP" sz="1400" b="0" i="1" smtClean="0">
+                        <a:rPr lang="en-US" altLang="ja-JP" sz="1050" b="0" i="1" smtClean="0">
                           <a:latin typeface="Cambria Math"/>
                           <a:ea typeface="+mj-ea"/>
                           <a:cs typeface="Courier New" pitchFamily="49" charset="0"/>
@@ -2037,7 +2037,7 @@
                         <m:t>=</m:t>
                       </m:r>
                       <m:r>
-                        <a:rPr lang="en-US" altLang="ja-JP" sz="1400" b="0" i="1" smtClean="0">
+                        <a:rPr lang="en-US" altLang="ja-JP" sz="1050" b="0" i="1" smtClean="0">
                           <a:latin typeface="Cambria Math"/>
                           <a:ea typeface="+mj-ea"/>
                           <a:cs typeface="Courier New" pitchFamily="49" charset="0"/>
@@ -2047,7 +2047,7 @@
                       <m:d>
                         <m:dPr>
                           <m:ctrlPr>
-                            <a:rPr lang="en-US" altLang="ja-JP" sz="1400" b="0" i="1" smtClean="0">
+                            <a:rPr lang="en-US" altLang="ja-JP" sz="1050" b="0" i="1" smtClean="0">
                               <a:latin typeface="Cambria Math"/>
                               <a:ea typeface="+mj-ea"/>
                               <a:cs typeface="Courier New" pitchFamily="49" charset="0"/>
@@ -2056,7 +2056,7 @@
                         </m:dPr>
                         <m:e>
                           <m:r>
-                            <a:rPr lang="en-US" altLang="ja-JP" sz="1400" b="0" i="1" smtClean="0">
+                            <a:rPr lang="en-US" altLang="ja-JP" sz="1050" b="0" i="1" smtClean="0">
                               <a:latin typeface="Cambria Math"/>
                               <a:ea typeface="+mj-ea"/>
                               <a:cs typeface="Courier New" pitchFamily="49" charset="0"/>
@@ -2066,7 +2066,7 @@
                         </m:e>
                       </m:d>
                       <m:r>
-                        <a:rPr lang="en-US" altLang="ja-JP" sz="1400" b="0" i="1" smtClean="0">
+                        <a:rPr lang="en-US" altLang="ja-JP" sz="1050" b="0" i="1" smtClean="0">
                           <a:latin typeface="Cambria Math"/>
                           <a:ea typeface="+mj-ea"/>
                           <a:cs typeface="Courier New" pitchFamily="49" charset="0"/>
@@ -2076,7 +2076,7 @@
                       <m:sSub>
                         <m:sSubPr>
                           <m:ctrlPr>
-                            <a:rPr lang="en-US" altLang="ja-JP" sz="1400" b="0" i="1" smtClean="0">
+                            <a:rPr lang="en-US" altLang="ja-JP" sz="1050" b="0" i="1" smtClean="0">
                               <a:latin typeface="Cambria Math"/>
                               <a:ea typeface="+mj-ea"/>
                               <a:cs typeface="Courier New" pitchFamily="49" charset="0"/>
@@ -2085,7 +2085,7 @@
                         </m:sSubPr>
                         <m:e>
                           <m:r>
-                            <a:rPr lang="en-US" altLang="ja-JP" sz="1400" b="0" i="1" smtClean="0">
+                            <a:rPr lang="en-US" altLang="ja-JP" sz="1050" b="0" i="1" smtClean="0">
                               <a:latin typeface="Cambria Math"/>
                               <a:ea typeface="+mj-ea"/>
                               <a:cs typeface="Courier New" pitchFamily="49" charset="0"/>
@@ -2095,7 +2095,7 @@
                         </m:e>
                         <m:sub>
                           <m:r>
-                            <a:rPr lang="en-US" altLang="ja-JP" sz="1400" b="0" i="1" smtClean="0">
+                            <a:rPr lang="en-US" altLang="ja-JP" sz="1050" b="0" i="1" smtClean="0">
                               <a:latin typeface="Cambria Math"/>
                               <a:ea typeface="+mj-ea"/>
                               <a:cs typeface="Courier New" pitchFamily="49" charset="0"/>
@@ -2105,7 +2105,7 @@
                         </m:sub>
                       </m:sSub>
                       <m:r>
-                        <a:rPr lang="en-US" altLang="ja-JP" sz="1400" b="0" i="1" smtClean="0">
+                        <a:rPr lang="en-US" altLang="ja-JP" sz="1050" b="0" i="1" smtClean="0">
                           <a:latin typeface="Cambria Math"/>
                           <a:ea typeface="+mj-ea"/>
                           <a:cs typeface="Courier New" pitchFamily="49" charset="0"/>
@@ -2115,7 +2115,7 @@
                       <m:sSub>
                         <m:sSubPr>
                           <m:ctrlPr>
-                            <a:rPr lang="en-US" altLang="ja-JP" sz="1400" b="0" i="1" smtClean="0">
+                            <a:rPr lang="en-US" altLang="ja-JP" sz="1050" b="0" i="1" smtClean="0">
                               <a:latin typeface="Cambria Math"/>
                               <a:ea typeface="+mj-ea"/>
                               <a:cs typeface="Courier New" pitchFamily="49" charset="0"/>
@@ -2124,7 +2124,7 @@
                         </m:sSubPr>
                         <m:e>
                           <m:r>
-                            <a:rPr lang="en-US" altLang="ja-JP" sz="1400" b="0" i="1" smtClean="0">
+                            <a:rPr lang="en-US" altLang="ja-JP" sz="1050" b="0" i="1" smtClean="0">
                               <a:latin typeface="Cambria Math"/>
                               <a:ea typeface="+mj-ea"/>
                               <a:cs typeface="Courier New" pitchFamily="49" charset="0"/>
@@ -2134,7 +2134,7 @@
                         </m:e>
                         <m:sub>
                           <m:r>
-                            <a:rPr lang="en-US" altLang="ja-JP" sz="1400" b="0" i="1" smtClean="0">
+                            <a:rPr lang="en-US" altLang="ja-JP" sz="1050" b="0" i="1" smtClean="0">
                               <a:latin typeface="Cambria Math"/>
                               <a:ea typeface="+mj-ea"/>
                               <a:cs typeface="Courier New" pitchFamily="49" charset="0"/>
@@ -2144,7 +2144,7 @@
                         </m:sub>
                       </m:sSub>
                       <m:r>
-                        <a:rPr lang="en-US" altLang="ja-JP" sz="1400" b="0" i="1" smtClean="0">
+                        <a:rPr lang="en-US" altLang="ja-JP" sz="1050" b="0" i="1" smtClean="0">
                           <a:latin typeface="Cambria Math"/>
                           <a:ea typeface="+mj-ea"/>
                           <a:cs typeface="Courier New" pitchFamily="49" charset="0"/>
@@ -2152,7 +2152,7 @@
                         <m:t>𝑥</m:t>
                       </m:r>
                       <m:r>
-                        <a:rPr lang="en-US" altLang="ja-JP" sz="1400" b="0" i="1" smtClean="0">
+                        <a:rPr lang="en-US" altLang="ja-JP" sz="1050" b="0" i="1" smtClean="0">
                           <a:latin typeface="Cambria Math"/>
                           <a:ea typeface="+mj-ea"/>
                           <a:cs typeface="Courier New" pitchFamily="49" charset="0"/>
@@ -2162,7 +2162,7 @@
                       <m:sSub>
                         <m:sSubPr>
                           <m:ctrlPr>
-                            <a:rPr lang="en-US" altLang="ja-JP" sz="1400" b="0" i="1" smtClean="0">
+                            <a:rPr lang="en-US" altLang="ja-JP" sz="1050" b="0" i="1" smtClean="0">
                               <a:latin typeface="Cambria Math"/>
                               <a:ea typeface="+mj-ea"/>
                               <a:cs typeface="Courier New" pitchFamily="49" charset="0"/>
@@ -2171,7 +2171,7 @@
                         </m:sSubPr>
                         <m:e>
                           <m:r>
-                            <a:rPr lang="en-US" altLang="ja-JP" sz="1400" b="0" i="1" smtClean="0">
+                            <a:rPr lang="en-US" altLang="ja-JP" sz="1050" b="0" i="1" smtClean="0">
                               <a:latin typeface="Cambria Math"/>
                               <a:ea typeface="+mj-ea"/>
                               <a:cs typeface="Courier New" pitchFamily="49" charset="0"/>
@@ -2181,7 +2181,7 @@
                         </m:e>
                         <m:sub>
                           <m:r>
-                            <a:rPr lang="en-US" altLang="ja-JP" sz="1400" b="0" i="1" smtClean="0">
+                            <a:rPr lang="en-US" altLang="ja-JP" sz="1050" b="0" i="1" smtClean="0">
                               <a:latin typeface="Cambria Math"/>
                               <a:ea typeface="+mj-ea"/>
                               <a:cs typeface="Courier New" pitchFamily="49" charset="0"/>
@@ -2193,7 +2193,7 @@
                       <m:sSup>
                         <m:sSupPr>
                           <m:ctrlPr>
-                            <a:rPr lang="en-US" altLang="ja-JP" sz="1400" b="0" i="1" smtClean="0">
+                            <a:rPr lang="en-US" altLang="ja-JP" sz="1050" b="0" i="1" smtClean="0">
                               <a:latin typeface="Cambria Math"/>
                               <a:ea typeface="+mj-ea"/>
                               <a:cs typeface="Courier New" pitchFamily="49" charset="0"/>
@@ -2202,7 +2202,7 @@
                         </m:sSupPr>
                         <m:e>
                           <m:r>
-                            <a:rPr lang="en-US" altLang="ja-JP" sz="1400" b="0" i="1" smtClean="0">
+                            <a:rPr lang="en-US" altLang="ja-JP" sz="1050" b="0" i="1" smtClean="0">
                               <a:latin typeface="Cambria Math"/>
                               <a:ea typeface="+mj-ea"/>
                               <a:cs typeface="Courier New" pitchFamily="49" charset="0"/>
@@ -2212,7 +2212,7 @@
                         </m:e>
                         <m:sup>
                           <m:r>
-                            <a:rPr lang="en-US" altLang="ja-JP" sz="1400" b="0" i="1" smtClean="0">
+                            <a:rPr lang="en-US" altLang="ja-JP" sz="1050" b="0" i="1" smtClean="0">
                               <a:latin typeface="Cambria Math"/>
                               <a:ea typeface="+mj-ea"/>
                               <a:cs typeface="Courier New" pitchFamily="49" charset="0"/>
@@ -2222,7 +2222,7 @@
                         </m:sup>
                       </m:sSup>
                       <m:r>
-                        <a:rPr lang="en-US" altLang="ja-JP" sz="1400" b="0" i="1" smtClean="0">
+                        <a:rPr lang="en-US" altLang="ja-JP" sz="1050" b="0" i="1" smtClean="0">
                           <a:latin typeface="Cambria Math"/>
                           <a:ea typeface="+mj-ea"/>
                           <a:cs typeface="Courier New" pitchFamily="49" charset="0"/>
@@ -2232,7 +2232,7 @@
                       <m:sSub>
                         <m:sSubPr>
                           <m:ctrlPr>
-                            <a:rPr lang="en-US" altLang="ja-JP" sz="1400" b="0" i="1" smtClean="0">
+                            <a:rPr lang="en-US" altLang="ja-JP" sz="1050" b="0" i="1" smtClean="0">
                               <a:latin typeface="Cambria Math"/>
                               <a:ea typeface="+mj-ea"/>
                               <a:cs typeface="Courier New" pitchFamily="49" charset="0"/>
@@ -2241,7 +2241,7 @@
                         </m:sSubPr>
                         <m:e>
                           <m:r>
-                            <a:rPr lang="en-US" altLang="ja-JP" sz="1400" b="0" i="1" smtClean="0">
+                            <a:rPr lang="en-US" altLang="ja-JP" sz="1050" b="0" i="1" smtClean="0">
                               <a:latin typeface="Cambria Math"/>
                               <a:ea typeface="+mj-ea"/>
                               <a:cs typeface="Courier New" pitchFamily="49" charset="0"/>
@@ -2251,7 +2251,7 @@
                         </m:e>
                         <m:sub>
                           <m:r>
-                            <a:rPr lang="en-US" altLang="ja-JP" sz="1400" b="0" i="1" smtClean="0">
+                            <a:rPr lang="en-US" altLang="ja-JP" sz="1050" b="0" i="1" smtClean="0">
                               <a:latin typeface="Cambria Math"/>
                               <a:ea typeface="+mj-ea"/>
                               <a:cs typeface="Courier New" pitchFamily="49" charset="0"/>
@@ -2263,7 +2263,7 @@
                       <m:sSup>
                         <m:sSupPr>
                           <m:ctrlPr>
-                            <a:rPr lang="en-US" altLang="ja-JP" sz="1400" b="0" i="1" smtClean="0">
+                            <a:rPr lang="en-US" altLang="ja-JP" sz="1050" b="0" i="1" smtClean="0">
                               <a:latin typeface="Cambria Math"/>
                               <a:ea typeface="+mj-ea"/>
                               <a:cs typeface="Courier New" pitchFamily="49" charset="0"/>
@@ -2272,7 +2272,7 @@
                         </m:sSupPr>
                         <m:e>
                           <m:r>
-                            <a:rPr lang="en-US" altLang="ja-JP" sz="1400" b="0" i="1" smtClean="0">
+                            <a:rPr lang="en-US" altLang="ja-JP" sz="1050" b="0" i="1" smtClean="0">
                               <a:latin typeface="Cambria Math"/>
                               <a:ea typeface="+mj-ea"/>
                               <a:cs typeface="Courier New" pitchFamily="49" charset="0"/>
@@ -2282,7 +2282,7 @@
                         </m:e>
                         <m:sup>
                           <m:r>
-                            <a:rPr lang="en-US" altLang="ja-JP" sz="1400" b="0" i="1" smtClean="0">
+                            <a:rPr lang="en-US" altLang="ja-JP" sz="1050" b="0" i="1" smtClean="0">
                               <a:latin typeface="Cambria Math"/>
                               <a:ea typeface="+mj-ea"/>
                               <a:cs typeface="Courier New" pitchFamily="49" charset="0"/>
@@ -2294,7 +2294,7 @@
                     </m:oMath>
                   </m:oMathPara>
                 </a14:m>
-                <a:endParaRPr lang="ja-JP" altLang="en-US" sz="1400">
+                <a:endParaRPr lang="ja-JP" altLang="en-US" sz="1050">
                   <a:latin typeface="+mj-ea"/>
                   <a:ea typeface="+mj-ea"/>
                   <a:cs typeface="Courier New" pitchFamily="49" charset="0"/>
@@ -2303,7 +2303,7 @@
             </p:txBody>
           </p:sp>
         </mc:Choice>
-        <mc:Fallback xmlns="">
+        <mc:Fallback>
           <p:sp>
             <p:nvSpPr>
               <p:cNvPr id="17" name="テキスト ボックス 16"/>
@@ -2314,8 +2314,8 @@
             </p:nvSpPr>
             <p:spPr>
               <a:xfrm>
-                <a:off x="1262214" y="1211238"/>
-                <a:ext cx="2779946" cy="258960"/>
+                <a:off x="1262214" y="1366178"/>
+                <a:ext cx="2105723" cy="205100"/>
               </a:xfrm>
               <a:prstGeom prst="rect">
                 <a:avLst/>
@@ -2323,7 +2323,7 @@
               <a:blipFill rotWithShape="1">
                 <a:blip r:embed="rId2"/>
                 <a:stretch>
-                  <a:fillRect b="-23810"/>
+                  <a:fillRect b="-20588"/>
                 </a:stretch>
               </a:blipFill>
               <a:ln w="19050" cap="rnd">
@@ -2354,8 +2354,8 @@
         </p:nvCxnSpPr>
         <p:spPr>
           <a:xfrm flipV="1">
-            <a:off x="1118198" y="986199"/>
-            <a:ext cx="0" cy="2034890"/>
+            <a:off x="1118198" y="1211238"/>
+            <a:ext cx="0" cy="1809851"/>
           </a:xfrm>
           <a:prstGeom prst="line">
             <a:avLst/>
@@ -2382,8 +2382,8 @@
           </a:fontRef>
         </p:style>
       </p:cxnSp>
-      <mc:AlternateContent xmlns:mc="http://schemas.openxmlformats.org/markup-compatibility/2006" xmlns:a14="http://schemas.microsoft.com/office/drawing/2010/main">
-        <mc:Choice Requires="a14">
+      <mc:AlternateContent xmlns:mc="http://schemas.openxmlformats.org/markup-compatibility/2006">
+        <mc:Choice xmlns:a14="http://schemas.microsoft.com/office/drawing/2010/main" Requires="a14">
           <p:sp>
             <p:nvSpPr>
               <p:cNvPr id="30" name="テキスト ボックス 29"/>
@@ -2393,7 +2393,7 @@
             <p:spPr>
               <a:xfrm>
                 <a:off x="941400" y="2935190"/>
-                <a:ext cx="240918" cy="258960"/>
+                <a:ext cx="204048" cy="205100"/>
               </a:xfrm>
               <a:prstGeom prst="rect">
                 <a:avLst/>
@@ -2418,7 +2418,7 @@
                     </m:oMathParaPr>
                     <m:oMath xmlns:m="http://schemas.openxmlformats.org/officeDocument/2006/math">
                       <m:r>
-                        <a:rPr lang="en-US" altLang="ja-JP" sz="1400" b="0" i="1" smtClean="0">
+                        <a:rPr lang="en-US" altLang="ja-JP" sz="1050" b="0" i="1" smtClean="0">
                           <a:latin typeface="Cambria Math"/>
                           <a:ea typeface="+mj-ea"/>
                           <a:cs typeface="Courier New" pitchFamily="49" charset="0"/>
@@ -2428,7 +2428,7 @@
                     </m:oMath>
                   </m:oMathPara>
                 </a14:m>
-                <a:endParaRPr lang="ja-JP" altLang="en-US" sz="1400">
+                <a:endParaRPr lang="ja-JP" altLang="en-US" sz="1050">
                   <a:latin typeface="+mj-ea"/>
                   <a:ea typeface="+mj-ea"/>
                   <a:cs typeface="Courier New" pitchFamily="49" charset="0"/>
@@ -2437,7 +2437,7 @@
             </p:txBody>
           </p:sp>
         </mc:Choice>
-        <mc:Fallback xmlns="">
+        <mc:Fallback>
           <p:sp>
             <p:nvSpPr>
               <p:cNvPr id="30" name="テキスト ボックス 29"/>
@@ -2449,7 +2449,7 @@
             <p:spPr>
               <a:xfrm>
                 <a:off x="941400" y="2935190"/>
-                <a:ext cx="240918" cy="258960"/>
+                <a:ext cx="204048" cy="205100"/>
               </a:xfrm>
               <a:prstGeom prst="rect">
                 <a:avLst/>
@@ -2480,8 +2480,8 @@
           </p:sp>
         </mc:Fallback>
       </mc:AlternateContent>
-      <mc:AlternateContent xmlns:mc="http://schemas.openxmlformats.org/markup-compatibility/2006" xmlns:a14="http://schemas.microsoft.com/office/drawing/2010/main">
-        <mc:Choice Requires="a14">
+      <mc:AlternateContent xmlns:mc="http://schemas.openxmlformats.org/markup-compatibility/2006">
+        <mc:Choice xmlns:a14="http://schemas.microsoft.com/office/drawing/2010/main" Requires="a14">
           <p:sp>
             <p:nvSpPr>
               <p:cNvPr id="31" name="テキスト ボックス 30"/>
@@ -2491,7 +2491,7 @@
             <p:spPr>
               <a:xfrm>
                 <a:off x="3124291" y="2939430"/>
-                <a:ext cx="243163" cy="258960"/>
+                <a:ext cx="204947" cy="205100"/>
               </a:xfrm>
               <a:prstGeom prst="rect">
                 <a:avLst/>
@@ -2516,7 +2516,7 @@
                     </m:oMathParaPr>
                     <m:oMath xmlns:m="http://schemas.openxmlformats.org/officeDocument/2006/math">
                       <m:r>
-                        <a:rPr lang="en-US" altLang="ja-JP" sz="1400" b="0" i="1" smtClean="0">
+                        <a:rPr lang="en-US" altLang="ja-JP" sz="1050" b="0" i="1" smtClean="0">
                           <a:latin typeface="Cambria Math"/>
                           <a:ea typeface="+mj-ea"/>
                           <a:cs typeface="Courier New" pitchFamily="49" charset="0"/>
@@ -2526,7 +2526,7 @@
                     </m:oMath>
                   </m:oMathPara>
                 </a14:m>
-                <a:endParaRPr lang="ja-JP" altLang="en-US" sz="1400">
+                <a:endParaRPr lang="ja-JP" altLang="en-US" sz="1050">
                   <a:latin typeface="+mj-ea"/>
                   <a:ea typeface="+mj-ea"/>
                   <a:cs typeface="Courier New" pitchFamily="49" charset="0"/>
@@ -2535,7 +2535,7 @@
             </p:txBody>
           </p:sp>
         </mc:Choice>
-        <mc:Fallback xmlns="">
+        <mc:Fallback>
           <p:sp>
             <p:nvSpPr>
               <p:cNvPr id="31" name="テキスト ボックス 30"/>
@@ -2547,7 +2547,7 @@
             <p:spPr>
               <a:xfrm>
                 <a:off x="3124291" y="2939430"/>
-                <a:ext cx="243163" cy="258960"/>
+                <a:ext cx="204947" cy="205100"/>
               </a:xfrm>
               <a:prstGeom prst="rect">
                 <a:avLst/>
@@ -2578,8 +2578,8 @@
           </p:sp>
         </mc:Fallback>
       </mc:AlternateContent>
-      <mc:AlternateContent xmlns:mc="http://schemas.openxmlformats.org/markup-compatibility/2006" xmlns:a14="http://schemas.microsoft.com/office/drawing/2010/main">
-        <mc:Choice Requires="a14">
+      <mc:AlternateContent xmlns:mc="http://schemas.openxmlformats.org/markup-compatibility/2006">
+        <mc:Choice xmlns:a14="http://schemas.microsoft.com/office/drawing/2010/main" Requires="a14">
           <p:sp>
             <p:nvSpPr>
               <p:cNvPr id="33" name="テキスト ボックス 32"/>
@@ -2588,8 +2588,8 @@
             </p:nvSpPr>
             <p:spPr>
               <a:xfrm>
-                <a:off x="875035" y="1067222"/>
-                <a:ext cx="245598" cy="258960"/>
+                <a:off x="875035" y="1222162"/>
+                <a:ext cx="206358" cy="205100"/>
               </a:xfrm>
               <a:prstGeom prst="rect">
                 <a:avLst/>
@@ -2614,7 +2614,7 @@
                     </m:oMathParaPr>
                     <m:oMath xmlns:m="http://schemas.openxmlformats.org/officeDocument/2006/math">
                       <m:r>
-                        <a:rPr lang="en-US" altLang="ja-JP" sz="1400" b="0" i="1" smtClean="0">
+                        <a:rPr lang="en-US" altLang="ja-JP" sz="1050" b="0" i="1" smtClean="0">
                           <a:latin typeface="Cambria Math"/>
                           <a:ea typeface="+mj-ea"/>
                           <a:cs typeface="Courier New" pitchFamily="49" charset="0"/>
@@ -2624,7 +2624,7 @@
                     </m:oMath>
                   </m:oMathPara>
                 </a14:m>
-                <a:endParaRPr lang="ja-JP" altLang="en-US" sz="1400">
+                <a:endParaRPr lang="ja-JP" altLang="en-US" sz="1050">
                   <a:latin typeface="+mj-ea"/>
                   <a:ea typeface="+mj-ea"/>
                   <a:cs typeface="Courier New" pitchFamily="49" charset="0"/>
@@ -2633,7 +2633,7 @@
             </p:txBody>
           </p:sp>
         </mc:Choice>
-        <mc:Fallback xmlns="">
+        <mc:Fallback>
           <p:sp>
             <p:nvSpPr>
               <p:cNvPr id="33" name="テキスト ボックス 32"/>
@@ -2644,8 +2644,8 @@
             </p:nvSpPr>
             <p:spPr>
               <a:xfrm>
-                <a:off x="875035" y="1067222"/>
-                <a:ext cx="245598" cy="258960"/>
+                <a:off x="875035" y="1222162"/>
+                <a:ext cx="206358" cy="205100"/>
               </a:xfrm>
               <a:prstGeom prst="rect">
                 <a:avLst/>
@@ -2653,7 +2653,7 @@
               <a:blipFill rotWithShape="1">
                 <a:blip r:embed="rId5"/>
                 <a:stretch>
-                  <a:fillRect b="-13953"/>
+                  <a:fillRect b="-14706"/>
                 </a:stretch>
               </a:blipFill>
               <a:ln w="19050" cap="rnd">
@@ -2782,12 +2782,12 @@
           <a:lstStyle/>
           <a:p>
             <a:pPr algn="ctr"/>
-            <a:endParaRPr kumimoji="1" lang="ja-JP" altLang="en-US"/>
+            <a:endParaRPr kumimoji="1" lang="ja-JP" altLang="en-US" sz="1050"/>
           </a:p>
         </p:txBody>
       </p:sp>
-      <mc:AlternateContent xmlns:mc="http://schemas.openxmlformats.org/markup-compatibility/2006" xmlns:a14="http://schemas.microsoft.com/office/drawing/2010/main">
-        <mc:Choice Requires="a14">
+      <mc:AlternateContent xmlns:mc="http://schemas.openxmlformats.org/markup-compatibility/2006">
+        <mc:Choice xmlns:a14="http://schemas.microsoft.com/office/drawing/2010/main" Requires="a14">
           <p:sp>
             <p:nvSpPr>
               <p:cNvPr id="35" name="テキスト ボックス 34"/>
@@ -2797,7 +2797,7 @@
             <p:spPr>
               <a:xfrm>
                 <a:off x="872600" y="2147342"/>
-                <a:ext cx="289521" cy="258960"/>
+                <a:ext cx="239700" cy="205100"/>
               </a:xfrm>
               <a:prstGeom prst="rect">
                 <a:avLst/>
@@ -2824,7 +2824,7 @@
                       <m:sSub>
                         <m:sSubPr>
                           <m:ctrlPr>
-                            <a:rPr lang="en-US" altLang="ja-JP" sz="1400" b="0" i="1" smtClean="0">
+                            <a:rPr lang="en-US" altLang="ja-JP" sz="1050" b="0" i="1" smtClean="0">
                               <a:latin typeface="Cambria Math"/>
                               <a:ea typeface="+mj-ea"/>
                               <a:cs typeface="Courier New" pitchFamily="49" charset="0"/>
@@ -2833,7 +2833,7 @@
                         </m:sSubPr>
                         <m:e>
                           <m:r>
-                            <a:rPr lang="en-US" altLang="ja-JP" sz="1400" b="0" i="1" smtClean="0">
+                            <a:rPr lang="en-US" altLang="ja-JP" sz="1050" b="0" i="1" smtClean="0">
                               <a:latin typeface="Cambria Math"/>
                               <a:ea typeface="+mj-ea"/>
                               <a:cs typeface="Courier New" pitchFamily="49" charset="0"/>
@@ -2843,7 +2843,7 @@
                         </m:e>
                         <m:sub>
                           <m:r>
-                            <a:rPr lang="en-US" altLang="ja-JP" sz="1400" b="0" i="1" smtClean="0">
+                            <a:rPr lang="en-US" altLang="ja-JP" sz="1050" b="0" i="1" smtClean="0">
                               <a:latin typeface="Cambria Math"/>
                               <a:ea typeface="+mj-ea"/>
                               <a:cs typeface="Courier New" pitchFamily="49" charset="0"/>
@@ -2855,7 +2855,7 @@
                     </m:oMath>
                   </m:oMathPara>
                 </a14:m>
-                <a:endParaRPr lang="ja-JP" altLang="en-US" sz="1400">
+                <a:endParaRPr lang="ja-JP" altLang="en-US" sz="1050">
                   <a:latin typeface="+mj-ea"/>
                   <a:ea typeface="+mj-ea"/>
                   <a:cs typeface="Courier New" pitchFamily="49" charset="0"/>
@@ -2864,7 +2864,7 @@
             </p:txBody>
           </p:sp>
         </mc:Choice>
-        <mc:Fallback xmlns="">
+        <mc:Fallback>
           <p:sp>
             <p:nvSpPr>
               <p:cNvPr id="35" name="テキスト ボックス 34"/>
@@ -2876,7 +2876,7 @@
             <p:spPr>
               <a:xfrm>
                 <a:off x="872600" y="2147342"/>
-                <a:ext cx="289521" cy="258960"/>
+                <a:ext cx="239700" cy="205100"/>
               </a:xfrm>
               <a:prstGeom prst="rect">
                 <a:avLst/>
@@ -2884,7 +2884,7 @@
               <a:blipFill rotWithShape="1">
                 <a:blip r:embed="rId6"/>
                 <a:stretch>
-                  <a:fillRect b="-4651"/>
+                  <a:fillRect b="-2941"/>
                 </a:stretch>
               </a:blipFill>
               <a:ln w="19050" cap="rnd">
@@ -2918,7 +2918,7 @@
             <p:spPr>
               <a:xfrm>
                 <a:off x="1277888" y="1859310"/>
-                <a:ext cx="703032" cy="258960"/>
+                <a:ext cx="549720" cy="205100"/>
               </a:xfrm>
               <a:prstGeom prst="rect">
                 <a:avLst/>
@@ -2945,7 +2945,7 @@
                       <m:sSub>
                         <m:sSubPr>
                           <m:ctrlPr>
-                            <a:rPr lang="en-US" altLang="ja-JP" sz="1400" b="0" i="1" smtClean="0">
+                            <a:rPr lang="en-US" altLang="ja-JP" sz="1050" b="0" i="1" smtClean="0">
                               <a:latin typeface="Cambria Math"/>
                               <a:ea typeface="+mj-ea"/>
                               <a:cs typeface="Courier New" pitchFamily="49" charset="0"/>
@@ -2954,7 +2954,7 @@
                         </m:sSubPr>
                         <m:e>
                           <m:r>
-                            <a:rPr lang="en-US" altLang="ja-JP" sz="1400" b="0" i="1" smtClean="0">
+                            <a:rPr lang="en-US" altLang="ja-JP" sz="1050" b="0" i="1" smtClean="0">
                               <a:latin typeface="Cambria Math"/>
                               <a:ea typeface="+mj-ea"/>
                               <a:cs typeface="Courier New" pitchFamily="49" charset="0"/>
@@ -2962,7 +2962,7 @@
                             <m:t>(</m:t>
                           </m:r>
                           <m:r>
-                            <a:rPr lang="en-US" altLang="ja-JP" sz="1400" b="0" i="1" smtClean="0">
+                            <a:rPr lang="en-US" altLang="ja-JP" sz="1050" b="0" i="1" smtClean="0">
                               <a:latin typeface="Cambria Math"/>
                               <a:ea typeface="+mj-ea"/>
                               <a:cs typeface="Courier New" pitchFamily="49" charset="0"/>
@@ -2972,7 +2972,7 @@
                         </m:e>
                         <m:sub>
                           <m:r>
-                            <a:rPr lang="en-US" altLang="ja-JP" sz="1400" b="0" i="1" smtClean="0">
+                            <a:rPr lang="en-US" altLang="ja-JP" sz="1050" b="0" i="1" smtClean="0">
                               <a:latin typeface="Cambria Math"/>
                               <a:ea typeface="+mj-ea"/>
                               <a:cs typeface="Courier New" pitchFamily="49" charset="0"/>
@@ -2982,7 +2982,7 @@
                         </m:sub>
                       </m:sSub>
                       <m:r>
-                        <a:rPr lang="en-US" altLang="ja-JP" sz="1400" b="0" i="1" smtClean="0">
+                        <a:rPr lang="en-US" altLang="ja-JP" sz="1050" b="0" i="1" smtClean="0">
                           <a:latin typeface="Cambria Math"/>
                           <a:ea typeface="+mj-ea"/>
                           <a:cs typeface="Courier New" pitchFamily="49" charset="0"/>
@@ -2992,7 +2992,7 @@
                       <m:sSub>
                         <m:sSubPr>
                           <m:ctrlPr>
-                            <a:rPr lang="en-US" altLang="ja-JP" sz="1400" b="0" i="1" smtClean="0">
+                            <a:rPr lang="en-US" altLang="ja-JP" sz="1050" b="0" i="1" smtClean="0">
                               <a:latin typeface="Cambria Math"/>
                               <a:ea typeface="+mj-ea"/>
                               <a:cs typeface="Courier New" pitchFamily="49" charset="0"/>
@@ -3001,7 +3001,7 @@
                         </m:sSubPr>
                         <m:e>
                           <m:r>
-                            <a:rPr lang="en-US" altLang="ja-JP" sz="1400" b="0" i="1" smtClean="0">
+                            <a:rPr lang="en-US" altLang="ja-JP" sz="1050" b="0" i="1" smtClean="0">
                               <a:latin typeface="Cambria Math"/>
                               <a:ea typeface="+mj-ea"/>
                               <a:cs typeface="Courier New" pitchFamily="49" charset="0"/>
@@ -3011,7 +3011,7 @@
                         </m:e>
                         <m:sub>
                           <m:r>
-                            <a:rPr lang="en-US" altLang="ja-JP" sz="1400" b="0" i="1" smtClean="0">
+                            <a:rPr lang="en-US" altLang="ja-JP" sz="1050" b="0" i="1" smtClean="0">
                               <a:latin typeface="Cambria Math"/>
                               <a:ea typeface="+mj-ea"/>
                               <a:cs typeface="Courier New" pitchFamily="49" charset="0"/>
@@ -3021,7 +3021,7 @@
                         </m:sub>
                       </m:sSub>
                       <m:r>
-                        <a:rPr lang="en-US" altLang="ja-JP" sz="1400" b="0" i="1" smtClean="0">
+                        <a:rPr lang="en-US" altLang="ja-JP" sz="1050" b="0" i="1" smtClean="0">
                           <a:latin typeface="Cambria Math"/>
                           <a:ea typeface="+mj-ea"/>
                           <a:cs typeface="Courier New" pitchFamily="49" charset="0"/>
@@ -3031,7 +3031,7 @@
                     </m:oMath>
                   </m:oMathPara>
                 </a14:m>
-                <a:endParaRPr lang="ja-JP" altLang="en-US" sz="1400">
+                <a:endParaRPr lang="ja-JP" altLang="en-US" sz="1050">
                   <a:latin typeface="+mj-ea"/>
                   <a:ea typeface="+mj-ea"/>
                   <a:cs typeface="Courier New" pitchFamily="49" charset="0"/>
@@ -3052,7 +3052,7 @@
             <p:spPr>
               <a:xfrm>
                 <a:off x="1277888" y="1859310"/>
-                <a:ext cx="703032" cy="258960"/>
+                <a:ext cx="549720" cy="205100"/>
               </a:xfrm>
               <a:prstGeom prst="rect">
                 <a:avLst/>
@@ -3060,7 +3060,7 @@
               <a:blipFill rotWithShape="1">
                 <a:blip r:embed="rId7"/>
                 <a:stretch>
-                  <a:fillRect l="-1739" r="-870" b="-23810"/>
+                  <a:fillRect b="-20588"/>
                 </a:stretch>
               </a:blipFill>
               <a:ln w="19050" cap="rnd">
@@ -3094,7 +3094,7 @@
             <p:spPr>
               <a:xfrm>
                 <a:off x="1716612" y="2346486"/>
-                <a:ext cx="711368" cy="258960"/>
+                <a:ext cx="556004" cy="205100"/>
               </a:xfrm>
               <a:prstGeom prst="rect">
                 <a:avLst/>
@@ -3121,7 +3121,7 @@
                       <m:sSub>
                         <m:sSubPr>
                           <m:ctrlPr>
-                            <a:rPr lang="en-US" altLang="ja-JP" sz="1400" b="0" i="1" smtClean="0">
+                            <a:rPr lang="en-US" altLang="ja-JP" sz="1050" b="0" i="1" smtClean="0">
                               <a:latin typeface="Cambria Math"/>
                               <a:ea typeface="+mj-ea"/>
                               <a:cs typeface="Courier New" pitchFamily="49" charset="0"/>
@@ -3130,7 +3130,7 @@
                         </m:sSubPr>
                         <m:e>
                           <m:r>
-                            <a:rPr lang="en-US" altLang="ja-JP" sz="1400" b="0" i="1" smtClean="0">
+                            <a:rPr lang="en-US" altLang="ja-JP" sz="1050" b="0" i="1" smtClean="0">
                               <a:latin typeface="Cambria Math"/>
                               <a:ea typeface="+mj-ea"/>
                               <a:cs typeface="Courier New" pitchFamily="49" charset="0"/>
@@ -3138,7 +3138,7 @@
                             <m:t>(</m:t>
                           </m:r>
                           <m:r>
-                            <a:rPr lang="en-US" altLang="ja-JP" sz="1400" b="0" i="1" smtClean="0">
+                            <a:rPr lang="en-US" altLang="ja-JP" sz="1050" b="0" i="1" smtClean="0">
                               <a:latin typeface="Cambria Math"/>
                               <a:ea typeface="+mj-ea"/>
                               <a:cs typeface="Courier New" pitchFamily="49" charset="0"/>
@@ -3148,7 +3148,7 @@
                         </m:e>
                         <m:sub>
                           <m:r>
-                            <a:rPr lang="en-US" altLang="ja-JP" sz="1400" b="0" i="1" smtClean="0">
+                            <a:rPr lang="en-US" altLang="ja-JP" sz="1050" b="0" i="1" smtClean="0">
                               <a:latin typeface="Cambria Math"/>
                               <a:ea typeface="+mj-ea"/>
                               <a:cs typeface="Courier New" pitchFamily="49" charset="0"/>
@@ -3158,7 +3158,7 @@
                         </m:sub>
                       </m:sSub>
                       <m:r>
-                        <a:rPr lang="en-US" altLang="ja-JP" sz="1400" b="0" i="1" smtClean="0">
+                        <a:rPr lang="en-US" altLang="ja-JP" sz="1050" b="0" i="1" smtClean="0">
                           <a:latin typeface="Cambria Math"/>
                           <a:ea typeface="+mj-ea"/>
                           <a:cs typeface="Courier New" pitchFamily="49" charset="0"/>
@@ -3168,7 +3168,7 @@
                       <m:sSub>
                         <m:sSubPr>
                           <m:ctrlPr>
-                            <a:rPr lang="en-US" altLang="ja-JP" sz="1400" b="0" i="1" smtClean="0">
+                            <a:rPr lang="en-US" altLang="ja-JP" sz="1050" b="0" i="1" smtClean="0">
                               <a:latin typeface="Cambria Math"/>
                               <a:ea typeface="+mj-ea"/>
                               <a:cs typeface="Courier New" pitchFamily="49" charset="0"/>
@@ -3177,7 +3177,7 @@
                         </m:sSubPr>
                         <m:e>
                           <m:r>
-                            <a:rPr lang="en-US" altLang="ja-JP" sz="1400" b="0" i="1" smtClean="0">
+                            <a:rPr lang="en-US" altLang="ja-JP" sz="1050" b="0" i="1" smtClean="0">
                               <a:latin typeface="Cambria Math"/>
                               <a:ea typeface="+mj-ea"/>
                               <a:cs typeface="Courier New" pitchFamily="49" charset="0"/>
@@ -3187,7 +3187,7 @@
                         </m:e>
                         <m:sub>
                           <m:r>
-                            <a:rPr lang="en-US" altLang="ja-JP" sz="1400" b="0" i="1" smtClean="0">
+                            <a:rPr lang="en-US" altLang="ja-JP" sz="1050" b="0" i="1" smtClean="0">
                               <a:latin typeface="Cambria Math"/>
                               <a:ea typeface="+mj-ea"/>
                               <a:cs typeface="Courier New" pitchFamily="49" charset="0"/>
@@ -3197,7 +3197,7 @@
                         </m:sub>
                       </m:sSub>
                       <m:r>
-                        <a:rPr lang="en-US" altLang="ja-JP" sz="1400" b="0" i="1" smtClean="0">
+                        <a:rPr lang="en-US" altLang="ja-JP" sz="1050" b="0" i="1" smtClean="0">
                           <a:latin typeface="Cambria Math"/>
                           <a:ea typeface="+mj-ea"/>
                           <a:cs typeface="Courier New" pitchFamily="49" charset="0"/>
@@ -3207,7 +3207,7 @@
                     </m:oMath>
                   </m:oMathPara>
                 </a14:m>
-                <a:endParaRPr lang="ja-JP" altLang="en-US" sz="1400">
+                <a:endParaRPr lang="ja-JP" altLang="en-US" sz="1050">
                   <a:latin typeface="+mj-ea"/>
                   <a:ea typeface="+mj-ea"/>
                   <a:cs typeface="Courier New" pitchFamily="49" charset="0"/>
@@ -3228,7 +3228,7 @@
             <p:spPr>
               <a:xfrm>
                 <a:off x="1716612" y="2346486"/>
-                <a:ext cx="711368" cy="258960"/>
+                <a:ext cx="556004" cy="205100"/>
               </a:xfrm>
               <a:prstGeom prst="rect">
                 <a:avLst/>
@@ -3236,7 +3236,7 @@
               <a:blipFill rotWithShape="1">
                 <a:blip r:embed="rId8"/>
                 <a:stretch>
-                  <a:fillRect l="-1724" r="-862" b="-23810"/>
+                  <a:fillRect b="-20588"/>
                 </a:stretch>
               </a:blipFill>
               <a:ln w="19050" cap="rnd">
@@ -3270,7 +3270,7 @@
             <p:spPr>
               <a:xfrm>
                 <a:off x="2616923" y="2347281"/>
-                <a:ext cx="703673" cy="258960"/>
+                <a:ext cx="550233" cy="205100"/>
               </a:xfrm>
               <a:prstGeom prst="rect">
                 <a:avLst/>
@@ -3295,7 +3295,7 @@
                     </m:oMathParaPr>
                     <m:oMath xmlns:m="http://schemas.openxmlformats.org/officeDocument/2006/math">
                       <m:r>
-                        <a:rPr lang="en-US" altLang="ja-JP" sz="1400" b="0" i="1" smtClean="0">
+                        <a:rPr lang="en-US" altLang="ja-JP" sz="1050" b="0" i="1" smtClean="0">
                           <a:latin typeface="Cambria Math"/>
                           <a:ea typeface="+mj-ea"/>
                           <a:cs typeface="Courier New" pitchFamily="49" charset="0"/>
@@ -3305,7 +3305,7 @@
                       <m:sSub>
                         <m:sSubPr>
                           <m:ctrlPr>
-                            <a:rPr lang="en-US" altLang="ja-JP" sz="1400" b="0" i="1" smtClean="0">
+                            <a:rPr lang="en-US" altLang="ja-JP" sz="1050" b="0" i="1" smtClean="0">
                               <a:latin typeface="Cambria Math"/>
                               <a:ea typeface="+mj-ea"/>
                               <a:cs typeface="Courier New" pitchFamily="49" charset="0"/>
@@ -3314,7 +3314,7 @@
                         </m:sSubPr>
                         <m:e>
                           <m:r>
-                            <a:rPr lang="en-US" altLang="ja-JP" sz="1400" b="0" i="1" smtClean="0">
+                            <a:rPr lang="en-US" altLang="ja-JP" sz="1050" b="0" i="1" smtClean="0">
                               <a:latin typeface="Cambria Math"/>
                               <a:ea typeface="+mj-ea"/>
                               <a:cs typeface="Courier New" pitchFamily="49" charset="0"/>
@@ -3324,7 +3324,7 @@
                         </m:e>
                         <m:sub>
                           <m:r>
-                            <a:rPr lang="en-US" altLang="ja-JP" sz="1400" b="0" i="1" smtClean="0">
+                            <a:rPr lang="en-US" altLang="ja-JP" sz="1050" b="0" i="1" smtClean="0">
                               <a:latin typeface="Cambria Math"/>
                               <a:ea typeface="+mj-ea"/>
                               <a:cs typeface="Courier New" pitchFamily="49" charset="0"/>
@@ -3334,7 +3334,7 @@
                         </m:sub>
                       </m:sSub>
                       <m:r>
-                        <a:rPr lang="en-US" altLang="ja-JP" sz="1400" b="0" i="1" smtClean="0">
+                        <a:rPr lang="en-US" altLang="ja-JP" sz="1050" b="0" i="1" smtClean="0">
                           <a:latin typeface="Cambria Math"/>
                           <a:ea typeface="+mj-ea"/>
                           <a:cs typeface="Courier New" pitchFamily="49" charset="0"/>
@@ -3344,7 +3344,7 @@
                       <m:sSub>
                         <m:sSubPr>
                           <m:ctrlPr>
-                            <a:rPr lang="en-US" altLang="ja-JP" sz="1400" b="0" i="1" smtClean="0">
+                            <a:rPr lang="en-US" altLang="ja-JP" sz="1050" b="0" i="1" smtClean="0">
                               <a:latin typeface="Cambria Math"/>
                               <a:ea typeface="+mj-ea"/>
                               <a:cs typeface="Courier New" pitchFamily="49" charset="0"/>
@@ -3353,7 +3353,7 @@
                         </m:sSubPr>
                         <m:e>
                           <m:r>
-                            <a:rPr lang="en-US" altLang="ja-JP" sz="1400" b="0" i="1" smtClean="0">
+                            <a:rPr lang="en-US" altLang="ja-JP" sz="1050" b="0" i="1" smtClean="0">
                               <a:latin typeface="Cambria Math"/>
                               <a:ea typeface="+mj-ea"/>
                               <a:cs typeface="Courier New" pitchFamily="49" charset="0"/>
@@ -3363,7 +3363,7 @@
                         </m:e>
                         <m:sub>
                           <m:r>
-                            <a:rPr lang="en-US" altLang="ja-JP" sz="1400" b="0" i="1" smtClean="0">
+                            <a:rPr lang="en-US" altLang="ja-JP" sz="1050" b="0" i="1" smtClean="0">
                               <a:latin typeface="Cambria Math"/>
                               <a:ea typeface="+mj-ea"/>
                               <a:cs typeface="Courier New" pitchFamily="49" charset="0"/>
@@ -3373,7 +3373,7 @@
                         </m:sub>
                       </m:sSub>
                       <m:r>
-                        <a:rPr lang="en-US" altLang="ja-JP" sz="1400" b="0" i="1" smtClean="0">
+                        <a:rPr lang="en-US" altLang="ja-JP" sz="1050" b="0" i="1" smtClean="0">
                           <a:latin typeface="Cambria Math"/>
                           <a:ea typeface="+mj-ea"/>
                           <a:cs typeface="Courier New" pitchFamily="49" charset="0"/>
@@ -3383,7 +3383,7 @@
                     </m:oMath>
                   </m:oMathPara>
                 </a14:m>
-                <a:endParaRPr lang="ja-JP" altLang="en-US" sz="1400">
+                <a:endParaRPr lang="ja-JP" altLang="en-US" sz="1050">
                   <a:latin typeface="+mj-ea"/>
                   <a:ea typeface="+mj-ea"/>
                   <a:cs typeface="Courier New" pitchFamily="49" charset="0"/>
@@ -3404,7 +3404,7 @@
             <p:spPr>
               <a:xfrm>
                 <a:off x="2616923" y="2347281"/>
-                <a:ext cx="703673" cy="258960"/>
+                <a:ext cx="550233" cy="205100"/>
               </a:xfrm>
               <a:prstGeom prst="rect">
                 <a:avLst/>
@@ -3412,7 +3412,7 @@
               <a:blipFill rotWithShape="1">
                 <a:blip r:embed="rId9"/>
                 <a:stretch>
-                  <a:fillRect l="-862" r="-862" b="-20930"/>
+                  <a:fillRect b="-20588"/>
                 </a:stretch>
               </a:blipFill>
               <a:ln w="19050" cap="rnd">
@@ -3479,7 +3479,7 @@
           <a:lstStyle/>
           <a:p>
             <a:pPr algn="ctr"/>
-            <a:endParaRPr kumimoji="1" lang="ja-JP" altLang="en-US"/>
+            <a:endParaRPr kumimoji="1" lang="ja-JP" altLang="en-US" sz="1050"/>
           </a:p>
         </p:txBody>
       </p:sp>
@@ -3527,7 +3527,7 @@
           <a:lstStyle/>
           <a:p>
             <a:pPr algn="ctr"/>
-            <a:endParaRPr kumimoji="1" lang="ja-JP" altLang="en-US"/>
+            <a:endParaRPr kumimoji="1" lang="ja-JP" altLang="en-US" sz="1050"/>
           </a:p>
         </p:txBody>
       </p:sp>
@@ -3575,7 +3575,7 @@
           <a:lstStyle/>
           <a:p>
             <a:pPr algn="ctr"/>
-            <a:endParaRPr kumimoji="1" lang="ja-JP" altLang="en-US"/>
+            <a:endParaRPr kumimoji="1" lang="ja-JP" altLang="en-US" sz="1050"/>
           </a:p>
         </p:txBody>
       </p:sp>
@@ -3623,7 +3623,7 @@
           <a:lstStyle/>
           <a:p>
             <a:pPr algn="ctr"/>
-            <a:endParaRPr kumimoji="1" lang="ja-JP" altLang="en-US"/>
+            <a:endParaRPr kumimoji="1" lang="ja-JP" altLang="en-US" sz="1050"/>
           </a:p>
         </p:txBody>
       </p:sp>
@@ -3638,7 +3638,7 @@
             <p:spPr>
               <a:xfrm>
                 <a:off x="2893204" y="1711394"/>
-                <a:ext cx="711368" cy="258960"/>
+                <a:ext cx="556004" cy="205100"/>
               </a:xfrm>
               <a:prstGeom prst="rect">
                 <a:avLst/>
@@ -3663,7 +3663,7 @@
                     </m:oMathParaPr>
                     <m:oMath xmlns:m="http://schemas.openxmlformats.org/officeDocument/2006/math">
                       <m:r>
-                        <a:rPr lang="en-US" altLang="ja-JP" sz="1400" b="0" i="1" smtClean="0">
+                        <a:rPr lang="en-US" altLang="ja-JP" sz="1050" b="0" i="1" smtClean="0">
                           <a:latin typeface="Cambria Math"/>
                           <a:ea typeface="+mj-ea"/>
                           <a:cs typeface="Courier New" pitchFamily="49" charset="0"/>
@@ -3673,7 +3673,7 @@
                       <m:sSub>
                         <m:sSubPr>
                           <m:ctrlPr>
-                            <a:rPr lang="en-US" altLang="ja-JP" sz="1400" b="0" i="1" smtClean="0">
+                            <a:rPr lang="en-US" altLang="ja-JP" sz="1050" b="0" i="1" smtClean="0">
                               <a:latin typeface="Cambria Math"/>
                               <a:ea typeface="+mj-ea"/>
                               <a:cs typeface="Courier New" pitchFamily="49" charset="0"/>
@@ -3682,7 +3682,7 @@
                         </m:sSubPr>
                         <m:e>
                           <m:r>
-                            <a:rPr lang="en-US" altLang="ja-JP" sz="1400" b="0" i="1" smtClean="0">
+                            <a:rPr lang="en-US" altLang="ja-JP" sz="1050" b="0" i="1" smtClean="0">
                               <a:latin typeface="Cambria Math"/>
                               <a:ea typeface="+mj-ea"/>
                               <a:cs typeface="Courier New" pitchFamily="49" charset="0"/>
@@ -3692,7 +3692,7 @@
                         </m:e>
                         <m:sub>
                           <m:r>
-                            <a:rPr lang="en-US" altLang="ja-JP" sz="1400" b="0" i="1" smtClean="0">
+                            <a:rPr lang="en-US" altLang="ja-JP" sz="1050" b="0" i="1" smtClean="0">
                               <a:latin typeface="Cambria Math"/>
                               <a:ea typeface="+mj-ea"/>
                               <a:cs typeface="Courier New" pitchFamily="49" charset="0"/>
@@ -3702,7 +3702,7 @@
                         </m:sub>
                       </m:sSub>
                       <m:r>
-                        <a:rPr lang="en-US" altLang="ja-JP" sz="1400" b="0" i="1" smtClean="0">
+                        <a:rPr lang="en-US" altLang="ja-JP" sz="1050" b="0" i="1" smtClean="0">
                           <a:latin typeface="Cambria Math"/>
                           <a:ea typeface="+mj-ea"/>
                           <a:cs typeface="Courier New" pitchFamily="49" charset="0"/>
@@ -3712,7 +3712,7 @@
                       <m:sSub>
                         <m:sSubPr>
                           <m:ctrlPr>
-                            <a:rPr lang="en-US" altLang="ja-JP" sz="1400" b="0" i="1" smtClean="0">
+                            <a:rPr lang="en-US" altLang="ja-JP" sz="1050" b="0" i="1" smtClean="0">
                               <a:latin typeface="Cambria Math"/>
                               <a:ea typeface="+mj-ea"/>
                               <a:cs typeface="Courier New" pitchFamily="49" charset="0"/>
@@ -3721,7 +3721,7 @@
                         </m:sSubPr>
                         <m:e>
                           <m:r>
-                            <a:rPr lang="en-US" altLang="ja-JP" sz="1400" b="0" i="1" smtClean="0">
+                            <a:rPr lang="en-US" altLang="ja-JP" sz="1050" b="0" i="1" smtClean="0">
                               <a:latin typeface="Cambria Math"/>
                               <a:ea typeface="+mj-ea"/>
                               <a:cs typeface="Courier New" pitchFamily="49" charset="0"/>
@@ -3731,7 +3731,7 @@
                         </m:e>
                         <m:sub>
                           <m:r>
-                            <a:rPr lang="en-US" altLang="ja-JP" sz="1400" b="0" i="1" smtClean="0">
+                            <a:rPr lang="en-US" altLang="ja-JP" sz="1050" b="0" i="1" smtClean="0">
                               <a:latin typeface="Cambria Math"/>
                               <a:ea typeface="+mj-ea"/>
                               <a:cs typeface="Courier New" pitchFamily="49" charset="0"/>
@@ -3741,7 +3741,7 @@
                         </m:sub>
                       </m:sSub>
                       <m:r>
-                        <a:rPr lang="en-US" altLang="ja-JP" sz="1400" b="0" i="1" smtClean="0">
+                        <a:rPr lang="en-US" altLang="ja-JP" sz="1050" b="0" i="1" smtClean="0">
                           <a:latin typeface="Cambria Math"/>
                           <a:ea typeface="+mj-ea"/>
                           <a:cs typeface="Courier New" pitchFamily="49" charset="0"/>
@@ -3751,7 +3751,7 @@
                     </m:oMath>
                   </m:oMathPara>
                 </a14:m>
-                <a:endParaRPr lang="ja-JP" altLang="en-US" sz="1400">
+                <a:endParaRPr lang="ja-JP" altLang="en-US" sz="1050">
                   <a:latin typeface="+mj-ea"/>
                   <a:ea typeface="+mj-ea"/>
                   <a:cs typeface="Courier New" pitchFamily="49" charset="0"/>
@@ -3772,7 +3772,7 @@
             <p:spPr>
               <a:xfrm>
                 <a:off x="2893204" y="1711394"/>
-                <a:ext cx="711368" cy="258960"/>
+                <a:ext cx="556004" cy="205100"/>
               </a:xfrm>
               <a:prstGeom prst="rect">
                 <a:avLst/>
@@ -3780,7 +3780,7 @@
               <a:blipFill rotWithShape="1">
                 <a:blip r:embed="rId10"/>
                 <a:stretch>
-                  <a:fillRect l="-1724" r="-862" b="-23810"/>
+                  <a:fillRect b="-24242"/>
                 </a:stretch>
               </a:blipFill>
               <a:ln w="19050" cap="rnd">
@@ -3847,7 +3847,7 @@
           <a:lstStyle/>
           <a:p>
             <a:pPr algn="ctr"/>
-            <a:endParaRPr kumimoji="1" lang="ja-JP" altLang="en-US"/>
+            <a:endParaRPr kumimoji="1" lang="ja-JP" altLang="en-US" sz="1050"/>
           </a:p>
         </p:txBody>
       </p:sp>
@@ -3895,7 +3895,7 @@
           <a:lstStyle/>
           <a:p>
             <a:pPr algn="ctr"/>
-            <a:endParaRPr kumimoji="1" lang="ja-JP" altLang="en-US"/>
+            <a:endParaRPr kumimoji="1" lang="ja-JP" altLang="en-US" sz="1050"/>
           </a:p>
         </p:txBody>
       </p:sp>
@@ -3910,7 +3910,7 @@
             <p:spPr>
               <a:xfrm>
                 <a:off x="2230399" y="2896494"/>
-                <a:ext cx="711367" cy="258960"/>
+                <a:ext cx="556004" cy="205100"/>
               </a:xfrm>
               <a:prstGeom prst="rect">
                 <a:avLst/>
@@ -3935,7 +3935,7 @@
                     </m:oMathParaPr>
                     <m:oMath xmlns:m="http://schemas.openxmlformats.org/officeDocument/2006/math">
                       <m:r>
-                        <a:rPr lang="en-US" altLang="ja-JP" sz="1400" b="0" i="1" smtClean="0">
+                        <a:rPr lang="en-US" altLang="ja-JP" sz="1050" b="0" i="1" smtClean="0">
                           <a:latin typeface="Cambria Math"/>
                           <a:ea typeface="+mj-ea"/>
                           <a:cs typeface="Courier New" pitchFamily="49" charset="0"/>
@@ -3945,7 +3945,7 @@
                       <m:sSub>
                         <m:sSubPr>
                           <m:ctrlPr>
-                            <a:rPr lang="en-US" altLang="ja-JP" sz="1400" b="0" i="1" smtClean="0">
+                            <a:rPr lang="en-US" altLang="ja-JP" sz="1050" b="0" i="1" smtClean="0">
                               <a:latin typeface="Cambria Math"/>
                               <a:ea typeface="+mj-ea"/>
                               <a:cs typeface="Courier New" pitchFamily="49" charset="0"/>
@@ -3954,7 +3954,7 @@
                         </m:sSubPr>
                         <m:e>
                           <m:r>
-                            <a:rPr lang="en-US" altLang="ja-JP" sz="1400" b="0" i="1" smtClean="0">
+                            <a:rPr lang="en-US" altLang="ja-JP" sz="1050" b="0" i="1" smtClean="0">
                               <a:latin typeface="Cambria Math"/>
                               <a:ea typeface="+mj-ea"/>
                               <a:cs typeface="Courier New" pitchFamily="49" charset="0"/>
@@ -3964,7 +3964,7 @@
                         </m:e>
                         <m:sub>
                           <m:r>
-                            <a:rPr lang="en-US" altLang="ja-JP" sz="1400" b="0" i="1" smtClean="0">
+                            <a:rPr lang="en-US" altLang="ja-JP" sz="1050" b="0" i="1" smtClean="0">
                               <a:latin typeface="Cambria Math"/>
                               <a:ea typeface="+mj-ea"/>
                               <a:cs typeface="Courier New" pitchFamily="49" charset="0"/>
@@ -3974,7 +3974,7 @@
                         </m:sub>
                       </m:sSub>
                       <m:r>
-                        <a:rPr lang="en-US" altLang="ja-JP" sz="1400" b="0" i="1" smtClean="0">
+                        <a:rPr lang="en-US" altLang="ja-JP" sz="1050" b="0" i="1" smtClean="0">
                           <a:latin typeface="Cambria Math"/>
                           <a:ea typeface="+mj-ea"/>
                           <a:cs typeface="Courier New" pitchFamily="49" charset="0"/>
@@ -3984,7 +3984,7 @@
                       <m:sSub>
                         <m:sSubPr>
                           <m:ctrlPr>
-                            <a:rPr lang="en-US" altLang="ja-JP" sz="1400" b="0" i="1" smtClean="0">
+                            <a:rPr lang="en-US" altLang="ja-JP" sz="1050" b="0" i="1" smtClean="0">
                               <a:latin typeface="Cambria Math"/>
                               <a:ea typeface="+mj-ea"/>
                               <a:cs typeface="Courier New" pitchFamily="49" charset="0"/>
@@ -3993,7 +3993,7 @@
                         </m:sSubPr>
                         <m:e>
                           <m:r>
-                            <a:rPr lang="en-US" altLang="ja-JP" sz="1400" b="0" i="1" smtClean="0">
+                            <a:rPr lang="en-US" altLang="ja-JP" sz="1050" b="0" i="1" smtClean="0">
                               <a:latin typeface="Cambria Math"/>
                               <a:ea typeface="+mj-ea"/>
                               <a:cs typeface="Courier New" pitchFamily="49" charset="0"/>
@@ -4003,7 +4003,7 @@
                         </m:e>
                         <m:sub>
                           <m:r>
-                            <a:rPr lang="en-US" altLang="ja-JP" sz="1400" b="0" i="1" smtClean="0">
+                            <a:rPr lang="en-US" altLang="ja-JP" sz="1050" b="0" i="1" smtClean="0">
                               <a:latin typeface="Cambria Math"/>
                               <a:ea typeface="+mj-ea"/>
                               <a:cs typeface="Courier New" pitchFamily="49" charset="0"/>
@@ -4013,7 +4013,7 @@
                         </m:sub>
                       </m:sSub>
                       <m:r>
-                        <a:rPr lang="en-US" altLang="ja-JP" sz="1400" b="0" i="1" smtClean="0">
+                        <a:rPr lang="en-US" altLang="ja-JP" sz="1050" b="0" i="1" smtClean="0">
                           <a:latin typeface="Cambria Math"/>
                           <a:ea typeface="+mj-ea"/>
                           <a:cs typeface="Courier New" pitchFamily="49" charset="0"/>
@@ -4023,7 +4023,7 @@
                     </m:oMath>
                   </m:oMathPara>
                 </a14:m>
-                <a:endParaRPr lang="ja-JP" altLang="en-US" sz="1400">
+                <a:endParaRPr lang="ja-JP" altLang="en-US" sz="1050">
                   <a:latin typeface="+mj-ea"/>
                   <a:ea typeface="+mj-ea"/>
                   <a:cs typeface="Courier New" pitchFamily="49" charset="0"/>
@@ -4044,7 +4044,7 @@
             <p:spPr>
               <a:xfrm>
                 <a:off x="2230399" y="2896494"/>
-                <a:ext cx="711367" cy="258960"/>
+                <a:ext cx="556004" cy="205100"/>
               </a:xfrm>
               <a:prstGeom prst="rect">
                 <a:avLst/>
@@ -4052,7 +4052,7 @@
               <a:blipFill rotWithShape="1">
                 <a:blip r:embed="rId11"/>
                 <a:stretch>
-                  <a:fillRect l="-1709" b="-20930"/>
+                  <a:fillRect b="-20588"/>
                 </a:stretch>
               </a:blipFill>
               <a:ln w="19050" cap="rnd">

</xml_diff>